<commit_message>
Made pdf of presentation
</commit_message>
<xml_diff>
--- a/intro_to_git_github.pptx
+++ b/intro_to_git_github.pptx
@@ -11,11 +11,13 @@
     <p:sldId id="259" r:id="rId5"/>
     <p:sldId id="260" r:id="rId6"/>
     <p:sldId id="262" r:id="rId7"/>
-    <p:sldId id="261" r:id="rId8"/>
-    <p:sldId id="263" r:id="rId9"/>
-    <p:sldId id="264" r:id="rId10"/>
-    <p:sldId id="265" r:id="rId11"/>
-    <p:sldId id="266" r:id="rId12"/>
+    <p:sldId id="268" r:id="rId8"/>
+    <p:sldId id="261" r:id="rId9"/>
+    <p:sldId id="263" r:id="rId10"/>
+    <p:sldId id="264" r:id="rId11"/>
+    <p:sldId id="265" r:id="rId12"/>
+    <p:sldId id="266" r:id="rId13"/>
+    <p:sldId id="267" r:id="rId14"/>
   </p:sldIdLst>
   <p:sldSz cx="12192000" cy="6858000"/>
   <p:notesSz cx="6858000" cy="9144000"/>
@@ -3453,12 +3455,40 @@
           <a:chExt cx="0" cy="0"/>
         </a:xfrm>
       </p:grpSpPr>
+      <p:sp>
+        <p:nvSpPr>
+          <p:cNvPr id="2" name="Title 1">
+            <a:extLst>
+              <a:ext uri="{FF2B5EF4-FFF2-40B4-BE49-F238E27FC236}">
+                <a16:creationId xmlns:a16="http://schemas.microsoft.com/office/drawing/2014/main" id="{238EABBE-3AEF-AC4C-8BFE-94C8CB18CBC6}"/>
+              </a:ext>
+            </a:extLst>
+          </p:cNvPr>
+          <p:cNvSpPr>
+            <a:spLocks noGrp="1"/>
+          </p:cNvSpPr>
+          <p:nvPr>
+            <p:ph type="title"/>
+          </p:nvPr>
+        </p:nvSpPr>
+        <p:spPr/>
+        <p:txBody>
+          <a:bodyPr/>
+          <a:lstStyle/>
+          <a:p>
+            <a:r>
+              <a:rPr lang="en-US" dirty="0"/>
+              <a:t>Pull requests allow you to collaborate on all public projects on GitHub! </a:t>
+            </a:r>
+          </a:p>
+        </p:txBody>
+      </p:sp>
       <p:pic>
         <p:nvPicPr>
           <p:cNvPr id="5" name="Content Placeholder 4">
             <a:extLst>
               <a:ext uri="{FF2B5EF4-FFF2-40B4-BE49-F238E27FC236}">
-                <a16:creationId xmlns:a16="http://schemas.microsoft.com/office/drawing/2014/main" id="{084DD718-5AC6-A84D-A709-2AC6A8ABA60C}"/>
+                <a16:creationId xmlns:a16="http://schemas.microsoft.com/office/drawing/2014/main" id="{2F86291C-ADCE-DF4C-AF86-0EBC440D5C03}"/>
               </a:ext>
             </a:extLst>
           </p:cNvPr>
@@ -3477,74 +3507,15 @@
         </p:blipFill>
         <p:spPr>
           <a:xfrm>
-            <a:off x="0" y="-252526"/>
-            <a:ext cx="10515600" cy="3375251"/>
+            <a:off x="838200" y="1844586"/>
+            <a:ext cx="10515600" cy="4313416"/>
           </a:xfrm>
         </p:spPr>
       </p:pic>
-      <p:sp>
-        <p:nvSpPr>
-          <p:cNvPr id="8" name="TextBox 7">
-            <a:extLst>
-              <a:ext uri="{FF2B5EF4-FFF2-40B4-BE49-F238E27FC236}">
-                <a16:creationId xmlns:a16="http://schemas.microsoft.com/office/drawing/2014/main" id="{E660C344-EF60-D140-9DD3-5FC003DD87AD}"/>
-              </a:ext>
-            </a:extLst>
-          </p:cNvPr>
-          <p:cNvSpPr txBox="1"/>
-          <p:nvPr/>
-        </p:nvSpPr>
-        <p:spPr>
-          <a:xfrm>
-            <a:off x="622300" y="3365944"/>
-            <a:ext cx="9448800" cy="2308324"/>
-          </a:xfrm>
-          <a:prstGeom prst="rect">
-            <a:avLst/>
-          </a:prstGeom>
-          <a:noFill/>
-        </p:spPr>
-        <p:txBody>
-          <a:bodyPr wrap="square" rtlCol="0">
-            <a:spAutoFit/>
-          </a:bodyPr>
-          <a:lstStyle/>
-          <a:p>
-            <a:pPr marL="285750" indent="-285750">
-              <a:buFont typeface="Arial" panose="020B0604020202020204" pitchFamily="34" charset="0"/>
-              <a:buChar char="•"/>
-            </a:pPr>
-            <a:r>
-              <a:rPr lang="en-US" sz="2400" dirty="0"/>
-              <a:t>Can easily distribute coding assignments to students</a:t>
-            </a:r>
-          </a:p>
-          <a:p>
-            <a:pPr marL="285750" indent="-285750">
-              <a:buFont typeface="Arial" panose="020B0604020202020204" pitchFamily="34" charset="0"/>
-              <a:buChar char="•"/>
-            </a:pPr>
-            <a:r>
-              <a:rPr lang="en-US" sz="2400" dirty="0"/>
-              <a:t>Knowing Git and GitHub is extremely valuable for working in industry, and this allows you to teach it to your students in a “controlled environment” (while also learning it yourself)</a:t>
-            </a:r>
-          </a:p>
-          <a:p>
-            <a:pPr marL="285750" indent="-285750">
-              <a:buFont typeface="Arial" panose="020B0604020202020204" pitchFamily="34" charset="0"/>
-              <a:buChar char="•"/>
-            </a:pPr>
-            <a:r>
-              <a:rPr lang="en-US" sz="2400" dirty="0"/>
-              <a:t>For more info: “Using GitHub Classroom to Teach Statistics” (Fiksel et al. 2019)</a:t>
-            </a:r>
-          </a:p>
-        </p:txBody>
-      </p:sp>
     </p:spTree>
     <p:extLst>
       <p:ext uri="{BB962C8B-B14F-4D97-AF65-F5344CB8AC3E}">
-        <p14:creationId xmlns:p14="http://schemas.microsoft.com/office/powerpoint/2010/main" val="3968322592"/>
+        <p14:creationId xmlns:p14="http://schemas.microsoft.com/office/powerpoint/2010/main" val="803216864"/>
       </p:ext>
     </p:extLst>
   </p:cSld>
@@ -3571,6 +3542,124 @@
           <a:chExt cx="0" cy="0"/>
         </a:xfrm>
       </p:grpSpPr>
+      <p:pic>
+        <p:nvPicPr>
+          <p:cNvPr id="5" name="Content Placeholder 4">
+            <a:extLst>
+              <a:ext uri="{FF2B5EF4-FFF2-40B4-BE49-F238E27FC236}">
+                <a16:creationId xmlns:a16="http://schemas.microsoft.com/office/drawing/2014/main" id="{084DD718-5AC6-A84D-A709-2AC6A8ABA60C}"/>
+              </a:ext>
+            </a:extLst>
+          </p:cNvPr>
+          <p:cNvPicPr>
+            <a:picLocks noGrp="1" noChangeAspect="1"/>
+          </p:cNvPicPr>
+          <p:nvPr>
+            <p:ph idx="1"/>
+          </p:nvPr>
+        </p:nvPicPr>
+        <p:blipFill>
+          <a:blip r:embed="rId2"/>
+          <a:stretch>
+            <a:fillRect/>
+          </a:stretch>
+        </p:blipFill>
+        <p:spPr>
+          <a:xfrm>
+            <a:off x="0" y="-252526"/>
+            <a:ext cx="10515600" cy="3375251"/>
+          </a:xfrm>
+        </p:spPr>
+      </p:pic>
+      <p:sp>
+        <p:nvSpPr>
+          <p:cNvPr id="8" name="TextBox 7">
+            <a:extLst>
+              <a:ext uri="{FF2B5EF4-FFF2-40B4-BE49-F238E27FC236}">
+                <a16:creationId xmlns:a16="http://schemas.microsoft.com/office/drawing/2014/main" id="{E660C344-EF60-D140-9DD3-5FC003DD87AD}"/>
+              </a:ext>
+            </a:extLst>
+          </p:cNvPr>
+          <p:cNvSpPr txBox="1"/>
+          <p:nvPr/>
+        </p:nvSpPr>
+        <p:spPr>
+          <a:xfrm>
+            <a:off x="622300" y="3365944"/>
+            <a:ext cx="9448800" cy="2308324"/>
+          </a:xfrm>
+          <a:prstGeom prst="rect">
+            <a:avLst/>
+          </a:prstGeom>
+          <a:noFill/>
+        </p:spPr>
+        <p:txBody>
+          <a:bodyPr wrap="square" rtlCol="0">
+            <a:spAutoFit/>
+          </a:bodyPr>
+          <a:lstStyle/>
+          <a:p>
+            <a:pPr marL="285750" indent="-285750">
+              <a:buFont typeface="Arial" panose="020B0604020202020204" pitchFamily="34" charset="0"/>
+              <a:buChar char="•"/>
+            </a:pPr>
+            <a:r>
+              <a:rPr lang="en-US" sz="2400" dirty="0"/>
+              <a:t>Can easily distribute coding assignments to students</a:t>
+            </a:r>
+          </a:p>
+          <a:p>
+            <a:pPr marL="285750" indent="-285750">
+              <a:buFont typeface="Arial" panose="020B0604020202020204" pitchFamily="34" charset="0"/>
+              <a:buChar char="•"/>
+            </a:pPr>
+            <a:r>
+              <a:rPr lang="en-US" sz="2400" dirty="0"/>
+              <a:t>Knowing Git and GitHub is extremely valuable for working in industry, and this allows you to teach it to your students in a “controlled environment” (while also learning it yourself)</a:t>
+            </a:r>
+          </a:p>
+          <a:p>
+            <a:pPr marL="285750" indent="-285750">
+              <a:buFont typeface="Arial" panose="020B0604020202020204" pitchFamily="34" charset="0"/>
+              <a:buChar char="•"/>
+            </a:pPr>
+            <a:r>
+              <a:rPr lang="en-US" sz="2400" dirty="0"/>
+              <a:t>For more info: “Using GitHub Classroom to Teach Statistics” (Fiksel et al. 2019)</a:t>
+            </a:r>
+          </a:p>
+        </p:txBody>
+      </p:sp>
+    </p:spTree>
+    <p:extLst>
+      <p:ext uri="{BB962C8B-B14F-4D97-AF65-F5344CB8AC3E}">
+        <p14:creationId xmlns:p14="http://schemas.microsoft.com/office/powerpoint/2010/main" val="3968322592"/>
+      </p:ext>
+    </p:extLst>
+  </p:cSld>
+  <p:clrMapOvr>
+    <a:masterClrMapping/>
+  </p:clrMapOvr>
+</p:sld>
+</file>
+
+<file path=ppt/slides/slide12.xml><?xml version="1.0" encoding="utf-8"?>
+<p:sld xmlns:a="http://schemas.openxmlformats.org/drawingml/2006/main" xmlns:r="http://schemas.openxmlformats.org/officeDocument/2006/relationships" xmlns:p="http://schemas.openxmlformats.org/presentationml/2006/main">
+  <p:cSld>
+    <p:spTree>
+      <p:nvGrpSpPr>
+        <p:cNvPr id="1" name=""/>
+        <p:cNvGrpSpPr/>
+        <p:nvPr/>
+      </p:nvGrpSpPr>
+      <p:grpSpPr>
+        <a:xfrm>
+          <a:off x="0" y="0"/>
+          <a:ext cx="0" cy="0"/>
+          <a:chOff x="0" y="0"/>
+          <a:chExt cx="0" cy="0"/>
+        </a:xfrm>
+      </p:grpSpPr>
       <p:sp>
         <p:nvSpPr>
           <p:cNvPr id="2" name="Title 1">
@@ -3678,6 +3767,113 @@
     <p:extLst>
       <p:ext uri="{BB962C8B-B14F-4D97-AF65-F5344CB8AC3E}">
         <p14:creationId xmlns:p14="http://schemas.microsoft.com/office/powerpoint/2010/main" val="3053069109"/>
+      </p:ext>
+    </p:extLst>
+  </p:cSld>
+  <p:clrMapOvr>
+    <a:masterClrMapping/>
+  </p:clrMapOvr>
+</p:sld>
+</file>
+
+<file path=ppt/slides/slide13.xml><?xml version="1.0" encoding="utf-8"?>
+<p:sld xmlns:a="http://schemas.openxmlformats.org/drawingml/2006/main" xmlns:r="http://schemas.openxmlformats.org/officeDocument/2006/relationships" xmlns:p="http://schemas.openxmlformats.org/presentationml/2006/main">
+  <p:cSld>
+    <p:spTree>
+      <p:nvGrpSpPr>
+        <p:cNvPr id="1" name=""/>
+        <p:cNvGrpSpPr/>
+        <p:nvPr/>
+      </p:nvGrpSpPr>
+      <p:grpSpPr>
+        <a:xfrm>
+          <a:off x="0" y="0"/>
+          <a:ext cx="0" cy="0"/>
+          <a:chOff x="0" y="0"/>
+          <a:chExt cx="0" cy="0"/>
+        </a:xfrm>
+      </p:grpSpPr>
+      <p:sp>
+        <p:nvSpPr>
+          <p:cNvPr id="2" name="Title 1">
+            <a:extLst>
+              <a:ext uri="{FF2B5EF4-FFF2-40B4-BE49-F238E27FC236}">
+                <a16:creationId xmlns:a16="http://schemas.microsoft.com/office/drawing/2014/main" id="{F11D6C6E-8283-0C4E-B57A-3CE83315DDD8}"/>
+              </a:ext>
+            </a:extLst>
+          </p:cNvPr>
+          <p:cNvSpPr>
+            <a:spLocks noGrp="1"/>
+          </p:cNvSpPr>
+          <p:nvPr>
+            <p:ph type="title"/>
+          </p:nvPr>
+        </p:nvSpPr>
+        <p:spPr/>
+        <p:txBody>
+          <a:bodyPr/>
+          <a:lstStyle/>
+          <a:p>
+            <a:r>
+              <a:rPr lang="en-US" dirty="0"/>
+              <a:t>You can view this presentation on my GitHub</a:t>
+            </a:r>
+          </a:p>
+        </p:txBody>
+      </p:sp>
+      <p:sp>
+        <p:nvSpPr>
+          <p:cNvPr id="3" name="Content Placeholder 2">
+            <a:extLst>
+              <a:ext uri="{FF2B5EF4-FFF2-40B4-BE49-F238E27FC236}">
+                <a16:creationId xmlns:a16="http://schemas.microsoft.com/office/drawing/2014/main" id="{0AC96D48-D018-F342-9D03-8BF87250F321}"/>
+              </a:ext>
+            </a:extLst>
+          </p:cNvPr>
+          <p:cNvSpPr>
+            <a:spLocks noGrp="1"/>
+          </p:cNvSpPr>
+          <p:nvPr>
+            <p:ph idx="1"/>
+          </p:nvPr>
+        </p:nvSpPr>
+        <p:spPr/>
+        <p:txBody>
+          <a:bodyPr/>
+          <a:lstStyle/>
+          <a:p>
+            <a:r>
+              <a:rPr lang="en-US" dirty="0"/>
+              <a:t>https://</a:t>
+            </a:r>
+            <a:r>
+              <a:rPr lang="en-US" dirty="0" err="1"/>
+              <a:t>github.com</a:t>
+            </a:r>
+            <a:r>
+              <a:rPr lang="en-US" dirty="0"/>
+              <a:t>/</a:t>
+            </a:r>
+            <a:r>
+              <a:rPr lang="en-US" dirty="0" err="1"/>
+              <a:t>jfiksel</a:t>
+            </a:r>
+            <a:r>
+              <a:rPr lang="en-US" dirty="0"/>
+              <a:t>/</a:t>
+            </a:r>
+            <a:r>
+              <a:rPr lang="en-US" dirty="0" err="1"/>
+              <a:t>intro_to_git_and_github</a:t>
+            </a:r>
+            <a:endParaRPr lang="en-US" dirty="0"/>
+          </a:p>
+        </p:txBody>
+      </p:sp>
+    </p:spTree>
+    <p:extLst>
+      <p:ext uri="{BB962C8B-B14F-4D97-AF65-F5344CB8AC3E}">
+        <p14:creationId xmlns:p14="http://schemas.microsoft.com/office/powerpoint/2010/main" val="303647578"/>
       </p:ext>
     </p:extLst>
   </p:cSld>
@@ -4476,6 +4672,41 @@
           </a:xfrm>
         </p:spPr>
       </p:pic>
+      <p:sp>
+        <p:nvSpPr>
+          <p:cNvPr id="6" name="TextBox 5">
+            <a:extLst>
+              <a:ext uri="{FF2B5EF4-FFF2-40B4-BE49-F238E27FC236}">
+                <a16:creationId xmlns:a16="http://schemas.microsoft.com/office/drawing/2014/main" id="{81CE5C2D-C28F-F14A-97FA-221BA37926AE}"/>
+              </a:ext>
+            </a:extLst>
+          </p:cNvPr>
+          <p:cNvSpPr txBox="1"/>
+          <p:nvPr/>
+        </p:nvSpPr>
+        <p:spPr>
+          <a:xfrm>
+            <a:off x="2476500" y="6090542"/>
+            <a:ext cx="6223000" cy="276999"/>
+          </a:xfrm>
+          <a:prstGeom prst="rect">
+            <a:avLst/>
+          </a:prstGeom>
+          <a:noFill/>
+        </p:spPr>
+        <p:txBody>
+          <a:bodyPr wrap="square" rtlCol="0">
+            <a:spAutoFit/>
+          </a:bodyPr>
+          <a:lstStyle/>
+          <a:p>
+            <a:r>
+              <a:rPr lang="en-US" sz="1200" dirty="0"/>
+              <a:t>Figure from Bryan (2017)</a:t>
+            </a:r>
+          </a:p>
+        </p:txBody>
+      </p:sp>
     </p:spTree>
     <p:extLst>
       <p:ext uri="{BB962C8B-B14F-4D97-AF65-F5344CB8AC3E}">
@@ -4511,6 +4742,128 @@
           <p:cNvPr id="2" name="Title 1">
             <a:extLst>
               <a:ext uri="{FF2B5EF4-FFF2-40B4-BE49-F238E27FC236}">
+                <a16:creationId xmlns:a16="http://schemas.microsoft.com/office/drawing/2014/main" id="{08C35C11-B1F8-AF4F-9360-6DF7452BE9F7}"/>
+              </a:ext>
+            </a:extLst>
+          </p:cNvPr>
+          <p:cNvSpPr>
+            <a:spLocks noGrp="1"/>
+          </p:cNvSpPr>
+          <p:nvPr>
+            <p:ph type="title"/>
+          </p:nvPr>
+        </p:nvSpPr>
+        <p:spPr/>
+        <p:txBody>
+          <a:bodyPr/>
+          <a:lstStyle/>
+          <a:p>
+            <a:r>
+              <a:rPr lang="en-US" dirty="0"/>
+              <a:t>GitHub allows for easy collaboration on projects</a:t>
+            </a:r>
+          </a:p>
+        </p:txBody>
+      </p:sp>
+      <p:pic>
+        <p:nvPicPr>
+          <p:cNvPr id="5" name="Content Placeholder 4">
+            <a:extLst>
+              <a:ext uri="{FF2B5EF4-FFF2-40B4-BE49-F238E27FC236}">
+                <a16:creationId xmlns:a16="http://schemas.microsoft.com/office/drawing/2014/main" id="{8E214853-17AC-BF46-9ADB-FE2888F4D484}"/>
+              </a:ext>
+            </a:extLst>
+          </p:cNvPr>
+          <p:cNvPicPr>
+            <a:picLocks noGrp="1" noChangeAspect="1"/>
+          </p:cNvPicPr>
+          <p:nvPr>
+            <p:ph idx="1"/>
+          </p:nvPr>
+        </p:nvPicPr>
+        <p:blipFill>
+          <a:blip r:embed="rId2"/>
+          <a:stretch>
+            <a:fillRect/>
+          </a:stretch>
+        </p:blipFill>
+        <p:spPr>
+          <a:xfrm>
+            <a:off x="3035300" y="2026444"/>
+            <a:ext cx="6121400" cy="3949700"/>
+          </a:xfrm>
+        </p:spPr>
+      </p:pic>
+      <p:sp>
+        <p:nvSpPr>
+          <p:cNvPr id="6" name="TextBox 5">
+            <a:extLst>
+              <a:ext uri="{FF2B5EF4-FFF2-40B4-BE49-F238E27FC236}">
+                <a16:creationId xmlns:a16="http://schemas.microsoft.com/office/drawing/2014/main" id="{4F89890B-426C-074C-9A0A-3EB653582A1C}"/>
+              </a:ext>
+            </a:extLst>
+          </p:cNvPr>
+          <p:cNvSpPr txBox="1"/>
+          <p:nvPr/>
+        </p:nvSpPr>
+        <p:spPr>
+          <a:xfrm>
+            <a:off x="2489200" y="6034901"/>
+            <a:ext cx="6223000" cy="276999"/>
+          </a:xfrm>
+          <a:prstGeom prst="rect">
+            <a:avLst/>
+          </a:prstGeom>
+          <a:noFill/>
+        </p:spPr>
+        <p:txBody>
+          <a:bodyPr wrap="square" rtlCol="0">
+            <a:spAutoFit/>
+          </a:bodyPr>
+          <a:lstStyle/>
+          <a:p>
+            <a:r>
+              <a:rPr lang="en-US" sz="1200" dirty="0"/>
+              <a:t>Figure from Bryan (2017)</a:t>
+            </a:r>
+          </a:p>
+        </p:txBody>
+      </p:sp>
+    </p:spTree>
+    <p:extLst>
+      <p:ext uri="{BB962C8B-B14F-4D97-AF65-F5344CB8AC3E}">
+        <p14:creationId xmlns:p14="http://schemas.microsoft.com/office/powerpoint/2010/main" val="2925372584"/>
+      </p:ext>
+    </p:extLst>
+  </p:cSld>
+  <p:clrMapOvr>
+    <a:masterClrMapping/>
+  </p:clrMapOvr>
+</p:sld>
+</file>
+
+<file path=ppt/slides/slide8.xml><?xml version="1.0" encoding="utf-8"?>
+<p:sld xmlns:a="http://schemas.openxmlformats.org/drawingml/2006/main" xmlns:r="http://schemas.openxmlformats.org/officeDocument/2006/relationships" xmlns:p="http://schemas.openxmlformats.org/presentationml/2006/main">
+  <p:cSld>
+    <p:spTree>
+      <p:nvGrpSpPr>
+        <p:cNvPr id="1" name=""/>
+        <p:cNvGrpSpPr/>
+        <p:nvPr/>
+      </p:nvGrpSpPr>
+      <p:grpSpPr>
+        <a:xfrm>
+          <a:off x="0" y="0"/>
+          <a:ext cx="0" cy="0"/>
+          <a:chOff x="0" y="0"/>
+          <a:chExt cx="0" cy="0"/>
+        </a:xfrm>
+      </p:grpSpPr>
+      <p:sp>
+        <p:nvSpPr>
+          <p:cNvPr id="2" name="Title 1">
+            <a:extLst>
+              <a:ext uri="{FF2B5EF4-FFF2-40B4-BE49-F238E27FC236}">
                 <a16:creationId xmlns:a16="http://schemas.microsoft.com/office/drawing/2014/main" id="{F600E52B-7059-294B-A6CA-0A217C7F51A6}"/>
               </a:ext>
             </a:extLst>
@@ -4576,7 +4929,7 @@
 </p:sld>
 </file>
 
-<file path=ppt/slides/slide8.xml><?xml version="1.0" encoding="utf-8"?>
+<file path=ppt/slides/slide9.xml><?xml version="1.0" encoding="utf-8"?>
 <p:sld xmlns:a="http://schemas.openxmlformats.org/drawingml/2006/main" xmlns:r="http://schemas.openxmlformats.org/officeDocument/2006/relationships" xmlns:p="http://schemas.openxmlformats.org/presentationml/2006/main">
   <p:cSld>
     <p:spTree>
@@ -4654,93 +5007,6 @@
     <p:extLst>
       <p:ext uri="{BB962C8B-B14F-4D97-AF65-F5344CB8AC3E}">
         <p14:creationId xmlns:p14="http://schemas.microsoft.com/office/powerpoint/2010/main" val="361613804"/>
-      </p:ext>
-    </p:extLst>
-  </p:cSld>
-  <p:clrMapOvr>
-    <a:masterClrMapping/>
-  </p:clrMapOvr>
-</p:sld>
-</file>
-
-<file path=ppt/slides/slide9.xml><?xml version="1.0" encoding="utf-8"?>
-<p:sld xmlns:a="http://schemas.openxmlformats.org/drawingml/2006/main" xmlns:r="http://schemas.openxmlformats.org/officeDocument/2006/relationships" xmlns:p="http://schemas.openxmlformats.org/presentationml/2006/main">
-  <p:cSld>
-    <p:spTree>
-      <p:nvGrpSpPr>
-        <p:cNvPr id="1" name=""/>
-        <p:cNvGrpSpPr/>
-        <p:nvPr/>
-      </p:nvGrpSpPr>
-      <p:grpSpPr>
-        <a:xfrm>
-          <a:off x="0" y="0"/>
-          <a:ext cx="0" cy="0"/>
-          <a:chOff x="0" y="0"/>
-          <a:chExt cx="0" cy="0"/>
-        </a:xfrm>
-      </p:grpSpPr>
-      <p:sp>
-        <p:nvSpPr>
-          <p:cNvPr id="2" name="Title 1">
-            <a:extLst>
-              <a:ext uri="{FF2B5EF4-FFF2-40B4-BE49-F238E27FC236}">
-                <a16:creationId xmlns:a16="http://schemas.microsoft.com/office/drawing/2014/main" id="{238EABBE-3AEF-AC4C-8BFE-94C8CB18CBC6}"/>
-              </a:ext>
-            </a:extLst>
-          </p:cNvPr>
-          <p:cNvSpPr>
-            <a:spLocks noGrp="1"/>
-          </p:cNvSpPr>
-          <p:nvPr>
-            <p:ph type="title"/>
-          </p:nvPr>
-        </p:nvSpPr>
-        <p:spPr/>
-        <p:txBody>
-          <a:bodyPr/>
-          <a:lstStyle/>
-          <a:p>
-            <a:r>
-              <a:rPr lang="en-US" dirty="0"/>
-              <a:t>Pull requests allow you to collaborate on all public projects on GitHub! </a:t>
-            </a:r>
-          </a:p>
-        </p:txBody>
-      </p:sp>
-      <p:pic>
-        <p:nvPicPr>
-          <p:cNvPr id="5" name="Content Placeholder 4">
-            <a:extLst>
-              <a:ext uri="{FF2B5EF4-FFF2-40B4-BE49-F238E27FC236}">
-                <a16:creationId xmlns:a16="http://schemas.microsoft.com/office/drawing/2014/main" id="{2F86291C-ADCE-DF4C-AF86-0EBC440D5C03}"/>
-              </a:ext>
-            </a:extLst>
-          </p:cNvPr>
-          <p:cNvPicPr>
-            <a:picLocks noGrp="1" noChangeAspect="1"/>
-          </p:cNvPicPr>
-          <p:nvPr>
-            <p:ph idx="1"/>
-          </p:nvPr>
-        </p:nvPicPr>
-        <p:blipFill>
-          <a:blip r:embed="rId2"/>
-          <a:stretch>
-            <a:fillRect/>
-          </a:stretch>
-        </p:blipFill>
-        <p:spPr>
-          <a:xfrm>
-            <a:off x="838200" y="1844586"/>
-            <a:ext cx="10515600" cy="4313416"/>
-          </a:xfrm>
-        </p:spPr>
-      </p:pic>
-    </p:spTree>
-    <p:extLst>
-      <p:ext uri="{BB962C8B-B14F-4D97-AF65-F5344CB8AC3E}">
-        <p14:creationId xmlns:p14="http://schemas.microsoft.com/office/powerpoint/2010/main" val="803216864"/>
       </p:ext>
     </p:extLst>
   </p:cSld>

</xml_diff>